<commit_message>
added slides for the model and calculations
</commit_message>
<xml_diff>
--- a/Presentation.pptx
+++ b/Presentation.pptx
@@ -18,11 +18,13 @@
     <p:sldId id="270" r:id="rId12"/>
     <p:sldId id="275" r:id="rId13"/>
     <p:sldId id="282" r:id="rId14"/>
-    <p:sldId id="262" r:id="rId15"/>
-    <p:sldId id="263" r:id="rId16"/>
-    <p:sldId id="264" r:id="rId17"/>
-    <p:sldId id="265" r:id="rId18"/>
-    <p:sldId id="266" r:id="rId19"/>
+    <p:sldId id="287" r:id="rId15"/>
+    <p:sldId id="288" r:id="rId16"/>
+    <p:sldId id="289" r:id="rId17"/>
+    <p:sldId id="263" r:id="rId18"/>
+    <p:sldId id="264" r:id="rId19"/>
+    <p:sldId id="265" r:id="rId20"/>
+    <p:sldId id="266" r:id="rId21"/>
   </p:sldIdLst>
   <p:sldSz cx="12192000" cy="6858000"/>
   <p:notesSz cx="6858000" cy="9144000"/>
@@ -37974,6 +37976,32 @@
 <file path=ppt/slides/slide13.xml><?xml version="1.0" encoding="utf-8"?>
 <p:sld xmlns:a="http://schemas.openxmlformats.org/drawingml/2006/main" xmlns:r="http://schemas.openxmlformats.org/officeDocument/2006/relationships" xmlns:p="http://schemas.openxmlformats.org/presentationml/2006/main">
   <p:cSld>
+    <p:bg>
+      <p:bgPr>
+        <a:gradFill flip="none" rotWithShape="1">
+          <a:gsLst>
+            <a:gs pos="23448">
+              <a:schemeClr val="tx1">
+                <a:lumMod val="85000"/>
+              </a:schemeClr>
+            </a:gs>
+            <a:gs pos="83000">
+              <a:schemeClr val="tx1">
+                <a:lumMod val="65000"/>
+              </a:schemeClr>
+            </a:gs>
+            <a:gs pos="100000">
+              <a:schemeClr val="bg2">
+                <a:lumMod val="50000"/>
+              </a:schemeClr>
+            </a:gs>
+          </a:gsLst>
+          <a:lin ang="4740000" scaled="1"/>
+          <a:tileRect/>
+        </a:gradFill>
+        <a:effectLst/>
+      </p:bgPr>
+    </p:bg>
     <p:spTree>
       <p:nvGrpSpPr>
         <p:cNvPr id="1" name=""/>
@@ -37990,10 +38018,10 @@
       </p:grpSpPr>
       <p:sp>
         <p:nvSpPr>
-          <p:cNvPr id="3" name="TextBox 2">
+          <p:cNvPr id="8" name="TextBox 7">
             <a:extLst>
               <a:ext uri="{FF2B5EF4-FFF2-40B4-BE49-F238E27FC236}">
-                <a16:creationId xmlns:a16="http://schemas.microsoft.com/office/drawing/2014/main" id="{E03A1BD5-672E-374E-9E30-401EB3C688D1}"/>
+                <a16:creationId xmlns:a16="http://schemas.microsoft.com/office/drawing/2014/main" id="{46C0A125-FF4F-6C43-B8AE-3C5B715290A5}"/>
               </a:ext>
             </a:extLst>
           </p:cNvPr>
@@ -38002,8 +38030,8 @@
         </p:nvSpPr>
         <p:spPr>
           <a:xfrm>
-            <a:off x="1058238" y="678094"/>
-            <a:ext cx="3606229" cy="369332"/>
+            <a:off x="823598" y="520095"/>
+            <a:ext cx="6015530" cy="1015663"/>
           </a:xfrm>
           <a:prstGeom prst="rect">
             <a:avLst/>
@@ -38016,16 +38044,81 @@
           </a:bodyPr>
           <a:lstStyle/>
           <a:p>
-            <a:endParaRPr lang="en-US" dirty="0"/>
+            <a:pPr marL="0" marR="0" lvl="0" indent="0" algn="l" defTabSz="457200" rtl="0" eaLnBrk="1" fontAlgn="auto" latinLnBrk="0" hangingPunct="1">
+              <a:lnSpc>
+                <a:spcPct val="100000"/>
+              </a:lnSpc>
+              <a:spcBef>
+                <a:spcPts val="0"/>
+              </a:spcBef>
+              <a:spcAft>
+                <a:spcPts val="0"/>
+              </a:spcAft>
+              <a:buClrTx/>
+              <a:buSzTx/>
+              <a:buFontTx/>
+              <a:buNone/>
+              <a:tabLst/>
+              <a:defRPr/>
+            </a:pPr>
+            <a:r>
+              <a:rPr lang="en-US" sz="6000" dirty="0">
+                <a:solidFill>
+                  <a:srgbClr val="16476F">
+                    <a:lumMod val="75000"/>
+                  </a:srgbClr>
+                </a:solidFill>
+                <a:latin typeface="Questrial" panose="02000000000000000000" pitchFamily="2" charset="0"/>
+              </a:rPr>
+              <a:t>our</a:t>
+            </a:r>
+            <a:r>
+              <a:rPr kumimoji="0" lang="en-US" sz="6000" b="0" i="0" u="none" strike="noStrike" kern="1200" cap="none" spc="0" normalizeH="0" baseline="0" noProof="0" dirty="0">
+                <a:ln>
+                  <a:noFill/>
+                </a:ln>
+                <a:solidFill>
+                  <a:srgbClr val="16476F">
+                    <a:lumMod val="75000"/>
+                  </a:srgbClr>
+                </a:solidFill>
+                <a:effectLst/>
+                <a:uLnTx/>
+                <a:uFillTx/>
+                <a:latin typeface="Questrial" panose="02000000000000000000" pitchFamily="2" charset="0"/>
+                <a:ea typeface="+mn-ea"/>
+                <a:cs typeface="+mn-cs"/>
+              </a:rPr>
+              <a:t> </a:t>
+            </a:r>
+            <a:r>
+              <a:rPr kumimoji="0" lang="en-US" sz="6000" b="1" i="0" u="none" strike="noStrike" kern="1200" cap="none" spc="0" normalizeH="0" baseline="0" noProof="0" dirty="0">
+                <a:ln>
+                  <a:noFill/>
+                </a:ln>
+                <a:solidFill>
+                  <a:srgbClr val="16476F">
+                    <a:lumMod val="75000"/>
+                  </a:srgbClr>
+                </a:solidFill>
+                <a:effectLst/>
+                <a:uLnTx/>
+                <a:uFillTx/>
+                <a:latin typeface="Questrial" panose="02000000000000000000" pitchFamily="2" charset="0"/>
+                <a:ea typeface="+mn-ea"/>
+                <a:cs typeface="+mn-cs"/>
+              </a:rPr>
+              <a:t>model</a:t>
+            </a:r>
           </a:p>
         </p:txBody>
       </p:sp>
       <p:sp>
         <p:nvSpPr>
-          <p:cNvPr id="4" name="TextBox 3">
+          <p:cNvPr id="7" name="TextBox 6">
             <a:extLst>
               <a:ext uri="{FF2B5EF4-FFF2-40B4-BE49-F238E27FC236}">
-                <a16:creationId xmlns:a16="http://schemas.microsoft.com/office/drawing/2014/main" id="{7D71584C-C8FB-FE4F-AC8F-7C28ED2B2892}"/>
+                <a16:creationId xmlns:a16="http://schemas.microsoft.com/office/drawing/2014/main" id="{63B711B5-FE9C-41C1-9BEF-FD36F6ED18FE}"/>
               </a:ext>
             </a:extLst>
           </p:cNvPr>
@@ -38052,18 +38145,215 @@
           </a:bodyPr>
           <a:lstStyle/>
           <a:p>
-            <a:pPr algn="ctr"/>
+            <a:pPr marL="0" marR="0" lvl="0" indent="0" algn="ctr" defTabSz="457200" rtl="0" eaLnBrk="1" fontAlgn="auto" latinLnBrk="0" hangingPunct="1">
+              <a:lnSpc>
+                <a:spcPct val="100000"/>
+              </a:lnSpc>
+              <a:spcBef>
+                <a:spcPts val="0"/>
+              </a:spcBef>
+              <a:spcAft>
+                <a:spcPts val="0"/>
+              </a:spcAft>
+              <a:buClrTx/>
+              <a:buSzTx/>
+              <a:buFontTx/>
+              <a:buNone/>
+              <a:tabLst/>
+              <a:defRPr/>
+            </a:pPr>
             <a:r>
-              <a:rPr lang="en-US" b="1" dirty="0"/>
-              <a:t>???</a:t>
+              <a:rPr kumimoji="0" lang="en-US" sz="1800" b="1" i="0" u="none" strike="noStrike" kern="1200" cap="none" spc="0" normalizeH="0" baseline="0" noProof="0" dirty="0">
+                <a:ln>
+                  <a:noFill/>
+                </a:ln>
+                <a:solidFill>
+                  <a:prstClr val="white"/>
+                </a:solidFill>
+                <a:effectLst/>
+                <a:uLnTx/>
+                <a:uFillTx/>
+                <a:latin typeface="Calibri" panose="020F0502020204030204"/>
+                <a:ea typeface="+mn-ea"/>
+                <a:cs typeface="+mn-cs"/>
+              </a:rPr>
+              <a:t>Emmy</a:t>
             </a:r>
+          </a:p>
+        </p:txBody>
+      </p:sp>
+      <p:sp>
+        <p:nvSpPr>
+          <p:cNvPr id="23" name="TextBox 22">
+            <a:extLst>
+              <a:ext uri="{FF2B5EF4-FFF2-40B4-BE49-F238E27FC236}">
+                <a16:creationId xmlns:a16="http://schemas.microsoft.com/office/drawing/2014/main" id="{3E0D7D6A-E115-4923-859C-18673DBA2851}"/>
+              </a:ext>
+            </a:extLst>
+          </p:cNvPr>
+          <p:cNvSpPr txBox="1"/>
+          <p:nvPr/>
+        </p:nvSpPr>
+        <p:spPr>
+          <a:xfrm>
+            <a:off x="1382398" y="2106281"/>
+            <a:ext cx="6440802" cy="400110"/>
+          </a:xfrm>
+          <a:prstGeom prst="rect">
+            <a:avLst/>
+          </a:prstGeom>
+          <a:noFill/>
+        </p:spPr>
+        <p:txBody>
+          <a:bodyPr wrap="square" rtlCol="0">
+            <a:spAutoFit/>
+          </a:bodyPr>
+          <a:lstStyle/>
+          <a:p>
+            <a:pPr marL="0" marR="0" lvl="0" indent="0" algn="l" defTabSz="457200" rtl="0" eaLnBrk="1" fontAlgn="auto" latinLnBrk="0" hangingPunct="1">
+              <a:lnSpc>
+                <a:spcPct val="100000"/>
+              </a:lnSpc>
+              <a:spcBef>
+                <a:spcPts val="0"/>
+              </a:spcBef>
+              <a:spcAft>
+                <a:spcPts val="0"/>
+              </a:spcAft>
+              <a:buClrTx/>
+              <a:buSzTx/>
+              <a:buFontTx/>
+              <a:buNone/>
+              <a:tabLst/>
+              <a:defRPr/>
+            </a:pPr>
+            <a:endParaRPr kumimoji="0" lang="en-US" sz="2000" b="1" i="0" u="none" strike="noStrike" kern="1200" cap="none" spc="0" normalizeH="0" baseline="0" noProof="0" dirty="0">
+              <a:ln>
+                <a:noFill/>
+              </a:ln>
+              <a:solidFill>
+                <a:srgbClr val="16476F">
+                  <a:lumMod val="75000"/>
+                </a:srgbClr>
+              </a:solidFill>
+              <a:effectLst/>
+              <a:uLnTx/>
+              <a:uFillTx/>
+              <a:latin typeface="Questrial" panose="02000000000000000000" pitchFamily="2" charset="0"/>
+              <a:ea typeface="+mn-ea"/>
+              <a:cs typeface="+mn-cs"/>
+            </a:endParaRPr>
+          </a:p>
+        </p:txBody>
+      </p:sp>
+      <p:pic>
+        <p:nvPicPr>
+          <p:cNvPr id="4" name="Picture 3">
+            <a:extLst>
+              <a:ext uri="{FF2B5EF4-FFF2-40B4-BE49-F238E27FC236}">
+                <a16:creationId xmlns:a16="http://schemas.microsoft.com/office/drawing/2014/main" id="{F1020E85-E34F-48BC-A89C-CEC8C015EC11}"/>
+              </a:ext>
+            </a:extLst>
+          </p:cNvPr>
+          <p:cNvPicPr>
+            <a:picLocks noChangeAspect="1"/>
+          </p:cNvPicPr>
+          <p:nvPr/>
+        </p:nvPicPr>
+        <p:blipFill rotWithShape="1">
+          <a:blip r:embed="rId2"/>
+          <a:srcRect r="59215"/>
+          <a:stretch/>
+        </p:blipFill>
+        <p:spPr>
+          <a:xfrm>
+            <a:off x="2597445" y="2349145"/>
+            <a:ext cx="6251860" cy="3233393"/>
+          </a:xfrm>
+          <a:prstGeom prst="rect">
+            <a:avLst/>
+          </a:prstGeom>
+        </p:spPr>
+      </p:pic>
+      <p:sp>
+        <p:nvSpPr>
+          <p:cNvPr id="28" name="TextBox 27">
+            <a:extLst>
+              <a:ext uri="{FF2B5EF4-FFF2-40B4-BE49-F238E27FC236}">
+                <a16:creationId xmlns:a16="http://schemas.microsoft.com/office/drawing/2014/main" id="{A12EBB0C-3859-45A4-ACE8-5E0C06FE8F9A}"/>
+              </a:ext>
+            </a:extLst>
+          </p:cNvPr>
+          <p:cNvSpPr txBox="1"/>
+          <p:nvPr/>
+        </p:nvSpPr>
+        <p:spPr>
+          <a:xfrm>
+            <a:off x="823598" y="1887480"/>
+            <a:ext cx="6440802" cy="461665"/>
+          </a:xfrm>
+          <a:prstGeom prst="rect">
+            <a:avLst/>
+          </a:prstGeom>
+          <a:noFill/>
+        </p:spPr>
+        <p:txBody>
+          <a:bodyPr wrap="square" rtlCol="0">
+            <a:spAutoFit/>
+          </a:bodyPr>
+          <a:lstStyle/>
+          <a:p>
+            <a:pPr marL="0" marR="0" lvl="0" indent="0" algn="l" defTabSz="457200" rtl="0" eaLnBrk="1" fontAlgn="auto" latinLnBrk="0" hangingPunct="1">
+              <a:lnSpc>
+                <a:spcPct val="100000"/>
+              </a:lnSpc>
+              <a:spcBef>
+                <a:spcPts val="0"/>
+              </a:spcBef>
+              <a:spcAft>
+                <a:spcPts val="0"/>
+              </a:spcAft>
+              <a:buClrTx/>
+              <a:buSzTx/>
+              <a:buFontTx/>
+              <a:buNone/>
+              <a:tabLst/>
+              <a:defRPr/>
+            </a:pPr>
+            <a:r>
+              <a:rPr lang="en-US" sz="2400" b="1" dirty="0">
+                <a:solidFill>
+                  <a:srgbClr val="16476F">
+                    <a:lumMod val="75000"/>
+                  </a:srgbClr>
+                </a:solidFill>
+                <a:latin typeface="Questrial" panose="02000000000000000000" pitchFamily="2" charset="0"/>
+              </a:rPr>
+              <a:t>Equal Weights for all Variables</a:t>
+            </a:r>
+            <a:endParaRPr kumimoji="0" lang="en-US" sz="2400" b="1" i="0" u="none" strike="noStrike" kern="1200" cap="none" spc="0" normalizeH="0" baseline="0" noProof="0" dirty="0">
+              <a:ln>
+                <a:noFill/>
+              </a:ln>
+              <a:solidFill>
+                <a:srgbClr val="16476F">
+                  <a:lumMod val="75000"/>
+                </a:srgbClr>
+              </a:solidFill>
+              <a:effectLst/>
+              <a:uLnTx/>
+              <a:uFillTx/>
+              <a:latin typeface="Questrial" panose="02000000000000000000" pitchFamily="2" charset="0"/>
+              <a:ea typeface="+mn-ea"/>
+              <a:cs typeface="+mn-cs"/>
+            </a:endParaRPr>
           </a:p>
         </p:txBody>
       </p:sp>
     </p:spTree>
     <p:extLst>
       <p:ext uri="{BB962C8B-B14F-4D97-AF65-F5344CB8AC3E}">
-        <p14:creationId xmlns:p14="http://schemas.microsoft.com/office/powerpoint/2010/main" val="2020585456"/>
+        <p14:creationId xmlns:p14="http://schemas.microsoft.com/office/powerpoint/2010/main" val="1159675632"/>
       </p:ext>
     </p:extLst>
   </p:cSld>
@@ -38074,6 +38364,1058 @@
 </file>
 
 <file path=ppt/slides/slide14.xml><?xml version="1.0" encoding="utf-8"?>
+<p:sld xmlns:a="http://schemas.openxmlformats.org/drawingml/2006/main" xmlns:r="http://schemas.openxmlformats.org/officeDocument/2006/relationships" xmlns:p="http://schemas.openxmlformats.org/presentationml/2006/main">
+  <p:cSld>
+    <p:bg>
+      <p:bgPr>
+        <a:gradFill flip="none" rotWithShape="1">
+          <a:gsLst>
+            <a:gs pos="23448">
+              <a:schemeClr val="tx1">
+                <a:lumMod val="85000"/>
+              </a:schemeClr>
+            </a:gs>
+            <a:gs pos="83000">
+              <a:schemeClr val="tx1">
+                <a:lumMod val="65000"/>
+              </a:schemeClr>
+            </a:gs>
+            <a:gs pos="100000">
+              <a:schemeClr val="bg2">
+                <a:lumMod val="50000"/>
+              </a:schemeClr>
+            </a:gs>
+          </a:gsLst>
+          <a:lin ang="4740000" scaled="1"/>
+          <a:tileRect/>
+        </a:gradFill>
+        <a:effectLst/>
+      </p:bgPr>
+    </p:bg>
+    <p:spTree>
+      <p:nvGrpSpPr>
+        <p:cNvPr id="1" name=""/>
+        <p:cNvGrpSpPr/>
+        <p:nvPr/>
+      </p:nvGrpSpPr>
+      <p:grpSpPr>
+        <a:xfrm>
+          <a:off x="0" y="0"/>
+          <a:ext cx="0" cy="0"/>
+          <a:chOff x="0" y="0"/>
+          <a:chExt cx="0" cy="0"/>
+        </a:xfrm>
+      </p:grpSpPr>
+      <p:sp>
+        <p:nvSpPr>
+          <p:cNvPr id="8" name="TextBox 7">
+            <a:extLst>
+              <a:ext uri="{FF2B5EF4-FFF2-40B4-BE49-F238E27FC236}">
+                <a16:creationId xmlns:a16="http://schemas.microsoft.com/office/drawing/2014/main" id="{46C0A125-FF4F-6C43-B8AE-3C5B715290A5}"/>
+              </a:ext>
+            </a:extLst>
+          </p:cNvPr>
+          <p:cNvSpPr txBox="1"/>
+          <p:nvPr/>
+        </p:nvSpPr>
+        <p:spPr>
+          <a:xfrm>
+            <a:off x="823598" y="520095"/>
+            <a:ext cx="6015530" cy="1015663"/>
+          </a:xfrm>
+          <a:prstGeom prst="rect">
+            <a:avLst/>
+          </a:prstGeom>
+          <a:noFill/>
+        </p:spPr>
+        <p:txBody>
+          <a:bodyPr wrap="square" rtlCol="0">
+            <a:spAutoFit/>
+          </a:bodyPr>
+          <a:lstStyle/>
+          <a:p>
+            <a:pPr marL="0" marR="0" lvl="0" indent="0" algn="l" defTabSz="457200" rtl="0" eaLnBrk="1" fontAlgn="auto" latinLnBrk="0" hangingPunct="1">
+              <a:lnSpc>
+                <a:spcPct val="100000"/>
+              </a:lnSpc>
+              <a:spcBef>
+                <a:spcPts val="0"/>
+              </a:spcBef>
+              <a:spcAft>
+                <a:spcPts val="0"/>
+              </a:spcAft>
+              <a:buClrTx/>
+              <a:buSzTx/>
+              <a:buFontTx/>
+              <a:buNone/>
+              <a:tabLst/>
+              <a:defRPr/>
+            </a:pPr>
+            <a:r>
+              <a:rPr lang="en-US" sz="6000" dirty="0">
+                <a:solidFill>
+                  <a:srgbClr val="16476F">
+                    <a:lumMod val="75000"/>
+                  </a:srgbClr>
+                </a:solidFill>
+                <a:latin typeface="Questrial" panose="02000000000000000000" pitchFamily="2" charset="0"/>
+              </a:rPr>
+              <a:t>our</a:t>
+            </a:r>
+            <a:r>
+              <a:rPr kumimoji="0" lang="en-US" sz="6000" b="0" i="0" u="none" strike="noStrike" kern="1200" cap="none" spc="0" normalizeH="0" baseline="0" noProof="0" dirty="0">
+                <a:ln>
+                  <a:noFill/>
+                </a:ln>
+                <a:solidFill>
+                  <a:srgbClr val="16476F">
+                    <a:lumMod val="75000"/>
+                  </a:srgbClr>
+                </a:solidFill>
+                <a:effectLst/>
+                <a:uLnTx/>
+                <a:uFillTx/>
+                <a:latin typeface="Questrial" panose="02000000000000000000" pitchFamily="2" charset="0"/>
+                <a:ea typeface="+mn-ea"/>
+                <a:cs typeface="+mn-cs"/>
+              </a:rPr>
+              <a:t> </a:t>
+            </a:r>
+            <a:r>
+              <a:rPr kumimoji="0" lang="en-US" sz="6000" b="1" i="0" u="none" strike="noStrike" kern="1200" cap="none" spc="0" normalizeH="0" baseline="0" noProof="0" dirty="0">
+                <a:ln>
+                  <a:noFill/>
+                </a:ln>
+                <a:solidFill>
+                  <a:srgbClr val="16476F">
+                    <a:lumMod val="75000"/>
+                  </a:srgbClr>
+                </a:solidFill>
+                <a:effectLst/>
+                <a:uLnTx/>
+                <a:uFillTx/>
+                <a:latin typeface="Questrial" panose="02000000000000000000" pitchFamily="2" charset="0"/>
+                <a:ea typeface="+mn-ea"/>
+                <a:cs typeface="+mn-cs"/>
+              </a:rPr>
+              <a:t>model</a:t>
+            </a:r>
+          </a:p>
+        </p:txBody>
+      </p:sp>
+      <p:sp>
+        <p:nvSpPr>
+          <p:cNvPr id="7" name="TextBox 6">
+            <a:extLst>
+              <a:ext uri="{FF2B5EF4-FFF2-40B4-BE49-F238E27FC236}">
+                <a16:creationId xmlns:a16="http://schemas.microsoft.com/office/drawing/2014/main" id="{63B711B5-FE9C-41C1-9BEF-FD36F6ED18FE}"/>
+              </a:ext>
+            </a:extLst>
+          </p:cNvPr>
+          <p:cNvSpPr txBox="1"/>
+          <p:nvPr/>
+        </p:nvSpPr>
+        <p:spPr>
+          <a:xfrm>
+            <a:off x="10602098" y="98854"/>
+            <a:ext cx="1309816" cy="369332"/>
+          </a:xfrm>
+          <a:prstGeom prst="rect">
+            <a:avLst/>
+          </a:prstGeom>
+          <a:solidFill>
+            <a:schemeClr val="accent2">
+              <a:lumMod val="50000"/>
+            </a:schemeClr>
+          </a:solidFill>
+        </p:spPr>
+        <p:txBody>
+          <a:bodyPr wrap="square" rtlCol="0">
+            <a:spAutoFit/>
+          </a:bodyPr>
+          <a:lstStyle/>
+          <a:p>
+            <a:pPr marL="0" marR="0" lvl="0" indent="0" algn="ctr" defTabSz="457200" rtl="0" eaLnBrk="1" fontAlgn="auto" latinLnBrk="0" hangingPunct="1">
+              <a:lnSpc>
+                <a:spcPct val="100000"/>
+              </a:lnSpc>
+              <a:spcBef>
+                <a:spcPts val="0"/>
+              </a:spcBef>
+              <a:spcAft>
+                <a:spcPts val="0"/>
+              </a:spcAft>
+              <a:buClrTx/>
+              <a:buSzTx/>
+              <a:buFontTx/>
+              <a:buNone/>
+              <a:tabLst/>
+              <a:defRPr/>
+            </a:pPr>
+            <a:r>
+              <a:rPr kumimoji="0" lang="en-US" sz="1800" b="1" i="0" u="none" strike="noStrike" kern="1200" cap="none" spc="0" normalizeH="0" baseline="0" noProof="0" dirty="0">
+                <a:ln>
+                  <a:noFill/>
+                </a:ln>
+                <a:solidFill>
+                  <a:prstClr val="white"/>
+                </a:solidFill>
+                <a:effectLst/>
+                <a:uLnTx/>
+                <a:uFillTx/>
+                <a:latin typeface="Calibri" panose="020F0502020204030204"/>
+                <a:ea typeface="+mn-ea"/>
+                <a:cs typeface="+mn-cs"/>
+              </a:rPr>
+              <a:t>Emmy</a:t>
+            </a:r>
+          </a:p>
+        </p:txBody>
+      </p:sp>
+      <p:sp>
+        <p:nvSpPr>
+          <p:cNvPr id="23" name="TextBox 22">
+            <a:extLst>
+              <a:ext uri="{FF2B5EF4-FFF2-40B4-BE49-F238E27FC236}">
+                <a16:creationId xmlns:a16="http://schemas.microsoft.com/office/drawing/2014/main" id="{3E0D7D6A-E115-4923-859C-18673DBA2851}"/>
+              </a:ext>
+            </a:extLst>
+          </p:cNvPr>
+          <p:cNvSpPr txBox="1"/>
+          <p:nvPr/>
+        </p:nvSpPr>
+        <p:spPr>
+          <a:xfrm>
+            <a:off x="823598" y="1887480"/>
+            <a:ext cx="6440802" cy="461665"/>
+          </a:xfrm>
+          <a:prstGeom prst="rect">
+            <a:avLst/>
+          </a:prstGeom>
+          <a:noFill/>
+        </p:spPr>
+        <p:txBody>
+          <a:bodyPr wrap="square" rtlCol="0">
+            <a:spAutoFit/>
+          </a:bodyPr>
+          <a:lstStyle/>
+          <a:p>
+            <a:pPr marL="0" marR="0" lvl="0" indent="0" algn="l" defTabSz="457200" rtl="0" eaLnBrk="1" fontAlgn="auto" latinLnBrk="0" hangingPunct="1">
+              <a:lnSpc>
+                <a:spcPct val="100000"/>
+              </a:lnSpc>
+              <a:spcBef>
+                <a:spcPts val="0"/>
+              </a:spcBef>
+              <a:spcAft>
+                <a:spcPts val="0"/>
+              </a:spcAft>
+              <a:buClrTx/>
+              <a:buSzTx/>
+              <a:buFontTx/>
+              <a:buNone/>
+              <a:tabLst/>
+              <a:defRPr/>
+            </a:pPr>
+            <a:r>
+              <a:rPr kumimoji="0" lang="en-US" sz="2400" b="1" i="0" u="none" strike="noStrike" kern="1200" cap="none" spc="0" normalizeH="0" baseline="0" noProof="0" dirty="0">
+                <a:ln>
+                  <a:noFill/>
+                </a:ln>
+                <a:solidFill>
+                  <a:srgbClr val="16476F">
+                    <a:lumMod val="75000"/>
+                  </a:srgbClr>
+                </a:solidFill>
+                <a:effectLst/>
+                <a:uLnTx/>
+                <a:uFillTx/>
+                <a:latin typeface="Questrial" panose="02000000000000000000" pitchFamily="2" charset="0"/>
+                <a:ea typeface="+mn-ea"/>
+                <a:cs typeface="+mn-cs"/>
+              </a:rPr>
+              <a:t>Weighting by Completeness of Data (years)</a:t>
+            </a:r>
+          </a:p>
+        </p:txBody>
+      </p:sp>
+      <p:pic>
+        <p:nvPicPr>
+          <p:cNvPr id="5" name="Picture 4">
+            <a:extLst>
+              <a:ext uri="{FF2B5EF4-FFF2-40B4-BE49-F238E27FC236}">
+                <a16:creationId xmlns:a16="http://schemas.microsoft.com/office/drawing/2014/main" id="{076B7B9D-2AEE-4170-865C-8B107EB56E43}"/>
+              </a:ext>
+            </a:extLst>
+          </p:cNvPr>
+          <p:cNvPicPr>
+            <a:picLocks noChangeAspect="1"/>
+          </p:cNvPicPr>
+          <p:nvPr/>
+        </p:nvPicPr>
+        <p:blipFill rotWithShape="1">
+          <a:blip r:embed="rId2"/>
+          <a:srcRect l="18021" r="17505"/>
+          <a:stretch/>
+        </p:blipFill>
+        <p:spPr>
+          <a:xfrm>
+            <a:off x="1000355" y="2579870"/>
+            <a:ext cx="9886393" cy="1122664"/>
+          </a:xfrm>
+          <a:prstGeom prst="rect">
+            <a:avLst/>
+          </a:prstGeom>
+        </p:spPr>
+      </p:pic>
+      <p:pic>
+        <p:nvPicPr>
+          <p:cNvPr id="3" name="Picture 2">
+            <a:extLst>
+              <a:ext uri="{FF2B5EF4-FFF2-40B4-BE49-F238E27FC236}">
+                <a16:creationId xmlns:a16="http://schemas.microsoft.com/office/drawing/2014/main" id="{B5A05406-4C85-4E27-9164-2EA278FD647C}"/>
+              </a:ext>
+            </a:extLst>
+          </p:cNvPr>
+          <p:cNvPicPr>
+            <a:picLocks noChangeAspect="1"/>
+          </p:cNvPicPr>
+          <p:nvPr/>
+        </p:nvPicPr>
+        <p:blipFill rotWithShape="1">
+          <a:blip r:embed="rId3"/>
+          <a:srcRect l="19266" r="18993"/>
+          <a:stretch/>
+        </p:blipFill>
+        <p:spPr>
+          <a:xfrm>
+            <a:off x="1164483" y="4405921"/>
+            <a:ext cx="9401782" cy="1122664"/>
+          </a:xfrm>
+          <a:prstGeom prst="rect">
+            <a:avLst/>
+          </a:prstGeom>
+        </p:spPr>
+      </p:pic>
+      <p:sp>
+        <p:nvSpPr>
+          <p:cNvPr id="9" name="TextBox 8">
+            <a:extLst>
+              <a:ext uri="{FF2B5EF4-FFF2-40B4-BE49-F238E27FC236}">
+                <a16:creationId xmlns:a16="http://schemas.microsoft.com/office/drawing/2014/main" id="{CF978420-B754-4676-ACA9-8B61DAB23A99}"/>
+              </a:ext>
+            </a:extLst>
+          </p:cNvPr>
+          <p:cNvSpPr txBox="1"/>
+          <p:nvPr/>
+        </p:nvSpPr>
+        <p:spPr>
+          <a:xfrm>
+            <a:off x="823598" y="3912278"/>
+            <a:ext cx="6440802" cy="461665"/>
+          </a:xfrm>
+          <a:prstGeom prst="rect">
+            <a:avLst/>
+          </a:prstGeom>
+          <a:noFill/>
+        </p:spPr>
+        <p:txBody>
+          <a:bodyPr wrap="square" rtlCol="0">
+            <a:spAutoFit/>
+          </a:bodyPr>
+          <a:lstStyle/>
+          <a:p>
+            <a:pPr marL="0" marR="0" lvl="0" indent="0" algn="l" defTabSz="457200" rtl="0" eaLnBrk="1" fontAlgn="auto" latinLnBrk="0" hangingPunct="1">
+              <a:lnSpc>
+                <a:spcPct val="100000"/>
+              </a:lnSpc>
+              <a:spcBef>
+                <a:spcPts val="0"/>
+              </a:spcBef>
+              <a:spcAft>
+                <a:spcPts val="0"/>
+              </a:spcAft>
+              <a:buClrTx/>
+              <a:buSzTx/>
+              <a:buFontTx/>
+              <a:buNone/>
+              <a:tabLst/>
+              <a:defRPr/>
+            </a:pPr>
+            <a:r>
+              <a:rPr kumimoji="0" lang="en-US" sz="2400" b="1" i="0" u="none" strike="noStrike" kern="1200" cap="none" spc="0" normalizeH="0" baseline="0" noProof="0" dirty="0">
+                <a:ln>
+                  <a:noFill/>
+                </a:ln>
+                <a:solidFill>
+                  <a:srgbClr val="16476F">
+                    <a:lumMod val="75000"/>
+                  </a:srgbClr>
+                </a:solidFill>
+                <a:effectLst/>
+                <a:uLnTx/>
+                <a:uFillTx/>
+                <a:latin typeface="Questrial" panose="02000000000000000000" pitchFamily="2" charset="0"/>
+                <a:ea typeface="+mn-ea"/>
+                <a:cs typeface="+mn-cs"/>
+              </a:rPr>
+              <a:t>Weighting by Reliability of Data after Cleaning</a:t>
+            </a:r>
+          </a:p>
+        </p:txBody>
+      </p:sp>
+    </p:spTree>
+    <p:extLst>
+      <p:ext uri="{BB962C8B-B14F-4D97-AF65-F5344CB8AC3E}">
+        <p14:creationId xmlns:p14="http://schemas.microsoft.com/office/powerpoint/2010/main" val="4229122040"/>
+      </p:ext>
+    </p:extLst>
+  </p:cSld>
+  <p:clrMapOvr>
+    <a:masterClrMapping/>
+  </p:clrMapOvr>
+</p:sld>
+</file>
+
+<file path=ppt/slides/slide15.xml><?xml version="1.0" encoding="utf-8"?>
+<p:sld xmlns:a="http://schemas.openxmlformats.org/drawingml/2006/main" xmlns:r="http://schemas.openxmlformats.org/officeDocument/2006/relationships" xmlns:p="http://schemas.openxmlformats.org/presentationml/2006/main">
+  <p:cSld>
+    <p:bg>
+      <p:bgPr>
+        <a:gradFill flip="none" rotWithShape="1">
+          <a:gsLst>
+            <a:gs pos="23448">
+              <a:schemeClr val="tx1">
+                <a:lumMod val="85000"/>
+              </a:schemeClr>
+            </a:gs>
+            <a:gs pos="83000">
+              <a:schemeClr val="tx1">
+                <a:lumMod val="65000"/>
+              </a:schemeClr>
+            </a:gs>
+            <a:gs pos="100000">
+              <a:schemeClr val="bg2">
+                <a:lumMod val="50000"/>
+              </a:schemeClr>
+            </a:gs>
+          </a:gsLst>
+          <a:lin ang="4740000" scaled="1"/>
+          <a:tileRect/>
+        </a:gradFill>
+        <a:effectLst/>
+      </p:bgPr>
+    </p:bg>
+    <p:spTree>
+      <p:nvGrpSpPr>
+        <p:cNvPr id="1" name=""/>
+        <p:cNvGrpSpPr/>
+        <p:nvPr/>
+      </p:nvGrpSpPr>
+      <p:grpSpPr>
+        <a:xfrm>
+          <a:off x="0" y="0"/>
+          <a:ext cx="0" cy="0"/>
+          <a:chOff x="0" y="0"/>
+          <a:chExt cx="0" cy="0"/>
+        </a:xfrm>
+      </p:grpSpPr>
+      <p:sp>
+        <p:nvSpPr>
+          <p:cNvPr id="8" name="TextBox 7">
+            <a:extLst>
+              <a:ext uri="{FF2B5EF4-FFF2-40B4-BE49-F238E27FC236}">
+                <a16:creationId xmlns:a16="http://schemas.microsoft.com/office/drawing/2014/main" id="{46C0A125-FF4F-6C43-B8AE-3C5B715290A5}"/>
+              </a:ext>
+            </a:extLst>
+          </p:cNvPr>
+          <p:cNvSpPr txBox="1"/>
+          <p:nvPr/>
+        </p:nvSpPr>
+        <p:spPr>
+          <a:xfrm>
+            <a:off x="823598" y="520095"/>
+            <a:ext cx="6015530" cy="1015663"/>
+          </a:xfrm>
+          <a:prstGeom prst="rect">
+            <a:avLst/>
+          </a:prstGeom>
+          <a:noFill/>
+        </p:spPr>
+        <p:txBody>
+          <a:bodyPr wrap="square" rtlCol="0">
+            <a:spAutoFit/>
+          </a:bodyPr>
+          <a:lstStyle/>
+          <a:p>
+            <a:pPr marL="0" marR="0" lvl="0" indent="0" algn="l" defTabSz="457200" rtl="0" eaLnBrk="1" fontAlgn="auto" latinLnBrk="0" hangingPunct="1">
+              <a:lnSpc>
+                <a:spcPct val="100000"/>
+              </a:lnSpc>
+              <a:spcBef>
+                <a:spcPts val="0"/>
+              </a:spcBef>
+              <a:spcAft>
+                <a:spcPts val="0"/>
+              </a:spcAft>
+              <a:buClrTx/>
+              <a:buSzTx/>
+              <a:buFontTx/>
+              <a:buNone/>
+              <a:tabLst/>
+              <a:defRPr/>
+            </a:pPr>
+            <a:r>
+              <a:rPr lang="en-US" sz="6000" dirty="0">
+                <a:solidFill>
+                  <a:srgbClr val="16476F">
+                    <a:lumMod val="75000"/>
+                  </a:srgbClr>
+                </a:solidFill>
+                <a:latin typeface="Questrial" panose="02000000000000000000" pitchFamily="2" charset="0"/>
+              </a:rPr>
+              <a:t>our</a:t>
+            </a:r>
+            <a:r>
+              <a:rPr kumimoji="0" lang="en-US" sz="6000" b="0" i="0" u="none" strike="noStrike" kern="1200" cap="none" spc="0" normalizeH="0" baseline="0" noProof="0" dirty="0">
+                <a:ln>
+                  <a:noFill/>
+                </a:ln>
+                <a:solidFill>
+                  <a:srgbClr val="16476F">
+                    <a:lumMod val="75000"/>
+                  </a:srgbClr>
+                </a:solidFill>
+                <a:effectLst/>
+                <a:uLnTx/>
+                <a:uFillTx/>
+                <a:latin typeface="Questrial" panose="02000000000000000000" pitchFamily="2" charset="0"/>
+                <a:ea typeface="+mn-ea"/>
+                <a:cs typeface="+mn-cs"/>
+              </a:rPr>
+              <a:t> </a:t>
+            </a:r>
+            <a:r>
+              <a:rPr kumimoji="0" lang="en-US" sz="6000" b="1" i="0" u="none" strike="noStrike" kern="1200" cap="none" spc="0" normalizeH="0" baseline="0" noProof="0" dirty="0">
+                <a:ln>
+                  <a:noFill/>
+                </a:ln>
+                <a:solidFill>
+                  <a:srgbClr val="16476F">
+                    <a:lumMod val="75000"/>
+                  </a:srgbClr>
+                </a:solidFill>
+                <a:effectLst/>
+                <a:uLnTx/>
+                <a:uFillTx/>
+                <a:latin typeface="Questrial" panose="02000000000000000000" pitchFamily="2" charset="0"/>
+                <a:ea typeface="+mn-ea"/>
+                <a:cs typeface="+mn-cs"/>
+              </a:rPr>
+              <a:t>model </a:t>
+            </a:r>
+          </a:p>
+        </p:txBody>
+      </p:sp>
+      <p:sp>
+        <p:nvSpPr>
+          <p:cNvPr id="7" name="TextBox 6">
+            <a:extLst>
+              <a:ext uri="{FF2B5EF4-FFF2-40B4-BE49-F238E27FC236}">
+                <a16:creationId xmlns:a16="http://schemas.microsoft.com/office/drawing/2014/main" id="{63B711B5-FE9C-41C1-9BEF-FD36F6ED18FE}"/>
+              </a:ext>
+            </a:extLst>
+          </p:cNvPr>
+          <p:cNvSpPr txBox="1"/>
+          <p:nvPr/>
+        </p:nvSpPr>
+        <p:spPr>
+          <a:xfrm>
+            <a:off x="10602098" y="98854"/>
+            <a:ext cx="1309816" cy="369332"/>
+          </a:xfrm>
+          <a:prstGeom prst="rect">
+            <a:avLst/>
+          </a:prstGeom>
+          <a:solidFill>
+            <a:schemeClr val="accent2">
+              <a:lumMod val="50000"/>
+            </a:schemeClr>
+          </a:solidFill>
+        </p:spPr>
+        <p:txBody>
+          <a:bodyPr wrap="square" rtlCol="0">
+            <a:spAutoFit/>
+          </a:bodyPr>
+          <a:lstStyle/>
+          <a:p>
+            <a:pPr marL="0" marR="0" lvl="0" indent="0" algn="ctr" defTabSz="457200" rtl="0" eaLnBrk="1" fontAlgn="auto" latinLnBrk="0" hangingPunct="1">
+              <a:lnSpc>
+                <a:spcPct val="100000"/>
+              </a:lnSpc>
+              <a:spcBef>
+                <a:spcPts val="0"/>
+              </a:spcBef>
+              <a:spcAft>
+                <a:spcPts val="0"/>
+              </a:spcAft>
+              <a:buClrTx/>
+              <a:buSzTx/>
+              <a:buFontTx/>
+              <a:buNone/>
+              <a:tabLst/>
+              <a:defRPr/>
+            </a:pPr>
+            <a:r>
+              <a:rPr kumimoji="0" lang="en-US" sz="1800" b="1" i="0" u="none" strike="noStrike" kern="1200" cap="none" spc="0" normalizeH="0" baseline="0" noProof="0" dirty="0">
+                <a:ln>
+                  <a:noFill/>
+                </a:ln>
+                <a:solidFill>
+                  <a:prstClr val="white"/>
+                </a:solidFill>
+                <a:effectLst/>
+                <a:uLnTx/>
+                <a:uFillTx/>
+                <a:latin typeface="Calibri" panose="020F0502020204030204"/>
+                <a:ea typeface="+mn-ea"/>
+                <a:cs typeface="+mn-cs"/>
+              </a:rPr>
+              <a:t>Emmy</a:t>
+            </a:r>
+          </a:p>
+        </p:txBody>
+      </p:sp>
+      <p:sp>
+        <p:nvSpPr>
+          <p:cNvPr id="23" name="TextBox 22">
+            <a:extLst>
+              <a:ext uri="{FF2B5EF4-FFF2-40B4-BE49-F238E27FC236}">
+                <a16:creationId xmlns:a16="http://schemas.microsoft.com/office/drawing/2014/main" id="{3E0D7D6A-E115-4923-859C-18673DBA2851}"/>
+              </a:ext>
+            </a:extLst>
+          </p:cNvPr>
+          <p:cNvSpPr txBox="1"/>
+          <p:nvPr/>
+        </p:nvSpPr>
+        <p:spPr>
+          <a:xfrm>
+            <a:off x="823598" y="1815149"/>
+            <a:ext cx="6440802" cy="584775"/>
+          </a:xfrm>
+          <a:prstGeom prst="rect">
+            <a:avLst/>
+          </a:prstGeom>
+          <a:noFill/>
+        </p:spPr>
+        <p:txBody>
+          <a:bodyPr wrap="square" rtlCol="0">
+            <a:spAutoFit/>
+          </a:bodyPr>
+          <a:lstStyle/>
+          <a:p>
+            <a:pPr marL="0" marR="0" lvl="0" indent="0" algn="l" defTabSz="457200" rtl="0" eaLnBrk="1" fontAlgn="auto" latinLnBrk="0" hangingPunct="1">
+              <a:lnSpc>
+                <a:spcPct val="100000"/>
+              </a:lnSpc>
+              <a:spcBef>
+                <a:spcPts val="0"/>
+              </a:spcBef>
+              <a:spcAft>
+                <a:spcPts val="0"/>
+              </a:spcAft>
+              <a:buClrTx/>
+              <a:buSzTx/>
+              <a:buFontTx/>
+              <a:buNone/>
+              <a:tabLst/>
+              <a:defRPr/>
+            </a:pPr>
+            <a:r>
+              <a:rPr kumimoji="0" lang="en-US" sz="3200" b="1" i="0" u="none" strike="noStrike" kern="1200" cap="none" spc="0" normalizeH="0" baseline="0" noProof="0" dirty="0">
+                <a:ln>
+                  <a:noFill/>
+                </a:ln>
+                <a:solidFill>
+                  <a:srgbClr val="16476F">
+                    <a:lumMod val="75000"/>
+                  </a:srgbClr>
+                </a:solidFill>
+                <a:effectLst/>
+                <a:uLnTx/>
+                <a:uFillTx/>
+                <a:latin typeface="Questrial" panose="02000000000000000000" pitchFamily="2" charset="0"/>
+                <a:ea typeface="+mn-ea"/>
+                <a:cs typeface="+mn-cs"/>
+              </a:rPr>
+              <a:t>Incorporating Opportunity Zones</a:t>
+            </a:r>
+          </a:p>
+        </p:txBody>
+      </p:sp>
+      <p:pic>
+        <p:nvPicPr>
+          <p:cNvPr id="4" name="Picture 3">
+            <a:extLst>
+              <a:ext uri="{FF2B5EF4-FFF2-40B4-BE49-F238E27FC236}">
+                <a16:creationId xmlns:a16="http://schemas.microsoft.com/office/drawing/2014/main" id="{B1D6ACAD-C19D-4F7C-9406-D47754A7FC15}"/>
+              </a:ext>
+            </a:extLst>
+          </p:cNvPr>
+          <p:cNvPicPr>
+            <a:picLocks noChangeAspect="1"/>
+          </p:cNvPicPr>
+          <p:nvPr/>
+        </p:nvPicPr>
+        <p:blipFill rotWithShape="1">
+          <a:blip r:embed="rId2"/>
+          <a:srcRect l="22763" r="23173"/>
+          <a:stretch/>
+        </p:blipFill>
+        <p:spPr>
+          <a:xfrm>
+            <a:off x="1034624" y="2882593"/>
+            <a:ext cx="5728677" cy="775769"/>
+          </a:xfrm>
+          <a:prstGeom prst="rect">
+            <a:avLst/>
+          </a:prstGeom>
+        </p:spPr>
+      </p:pic>
+      <p:pic>
+        <p:nvPicPr>
+          <p:cNvPr id="6" name="Picture 5">
+            <a:extLst>
+              <a:ext uri="{FF2B5EF4-FFF2-40B4-BE49-F238E27FC236}">
+                <a16:creationId xmlns:a16="http://schemas.microsoft.com/office/drawing/2014/main" id="{F9B33511-E858-4E92-B96F-2427E53F5654}"/>
+              </a:ext>
+            </a:extLst>
+          </p:cNvPr>
+          <p:cNvPicPr>
+            <a:picLocks noChangeAspect="1"/>
+          </p:cNvPicPr>
+          <p:nvPr/>
+        </p:nvPicPr>
+        <p:blipFill rotWithShape="1">
+          <a:blip r:embed="rId3"/>
+          <a:srcRect l="12746" r="13362"/>
+          <a:stretch/>
+        </p:blipFill>
+        <p:spPr>
+          <a:xfrm>
+            <a:off x="1034624" y="3857449"/>
+            <a:ext cx="7829600" cy="775769"/>
+          </a:xfrm>
+          <a:prstGeom prst="rect">
+            <a:avLst/>
+          </a:prstGeom>
+        </p:spPr>
+      </p:pic>
+      <p:pic>
+        <p:nvPicPr>
+          <p:cNvPr id="10" name="Picture 9">
+            <a:extLst>
+              <a:ext uri="{FF2B5EF4-FFF2-40B4-BE49-F238E27FC236}">
+                <a16:creationId xmlns:a16="http://schemas.microsoft.com/office/drawing/2014/main" id="{F24BF24E-1229-4AB6-AC62-DA55A35E6071}"/>
+              </a:ext>
+            </a:extLst>
+          </p:cNvPr>
+          <p:cNvPicPr>
+            <a:picLocks noChangeAspect="1"/>
+          </p:cNvPicPr>
+          <p:nvPr/>
+        </p:nvPicPr>
+        <p:blipFill rotWithShape="1">
+          <a:blip r:embed="rId4"/>
+          <a:srcRect l="12474" r="12074"/>
+          <a:stretch/>
+        </p:blipFill>
+        <p:spPr>
+          <a:xfrm>
+            <a:off x="1034624" y="5005223"/>
+            <a:ext cx="7939360" cy="775769"/>
+          </a:xfrm>
+          <a:prstGeom prst="rect">
+            <a:avLst/>
+          </a:prstGeom>
+        </p:spPr>
+      </p:pic>
+      <p:sp>
+        <p:nvSpPr>
+          <p:cNvPr id="12" name="TextBox 11">
+            <a:extLst>
+              <a:ext uri="{FF2B5EF4-FFF2-40B4-BE49-F238E27FC236}">
+                <a16:creationId xmlns:a16="http://schemas.microsoft.com/office/drawing/2014/main" id="{C8026E14-5F40-4007-8EC6-5C136D35C39C}"/>
+              </a:ext>
+            </a:extLst>
+          </p:cNvPr>
+          <p:cNvSpPr txBox="1"/>
+          <p:nvPr/>
+        </p:nvSpPr>
+        <p:spPr>
+          <a:xfrm>
+            <a:off x="823598" y="2528772"/>
+            <a:ext cx="6440802" cy="400110"/>
+          </a:xfrm>
+          <a:prstGeom prst="rect">
+            <a:avLst/>
+          </a:prstGeom>
+          <a:noFill/>
+        </p:spPr>
+        <p:txBody>
+          <a:bodyPr wrap="square" rtlCol="0">
+            <a:spAutoFit/>
+          </a:bodyPr>
+          <a:lstStyle/>
+          <a:p>
+            <a:pPr marL="0" marR="0" lvl="0" indent="0" algn="l" defTabSz="457200" rtl="0" eaLnBrk="1" fontAlgn="auto" latinLnBrk="0" hangingPunct="1">
+              <a:lnSpc>
+                <a:spcPct val="100000"/>
+              </a:lnSpc>
+              <a:spcBef>
+                <a:spcPts val="0"/>
+              </a:spcBef>
+              <a:spcAft>
+                <a:spcPts val="0"/>
+              </a:spcAft>
+              <a:buClrTx/>
+              <a:buSzTx/>
+              <a:buFontTx/>
+              <a:buNone/>
+              <a:tabLst/>
+              <a:defRPr/>
+            </a:pPr>
+            <a:r>
+              <a:rPr lang="en-US" sz="2000" b="1" dirty="0">
+                <a:solidFill>
+                  <a:srgbClr val="16476F">
+                    <a:lumMod val="75000"/>
+                  </a:srgbClr>
+                </a:solidFill>
+                <a:latin typeface="Questrial" panose="02000000000000000000" pitchFamily="2" charset="0"/>
+              </a:rPr>
+              <a:t>Equal Weights for all Variables</a:t>
+            </a:r>
+            <a:endParaRPr kumimoji="0" lang="en-US" sz="2000" b="1" i="0" u="none" strike="noStrike" kern="1200" cap="none" spc="0" normalizeH="0" baseline="0" noProof="0" dirty="0">
+              <a:ln>
+                <a:noFill/>
+              </a:ln>
+              <a:solidFill>
+                <a:srgbClr val="16476F">
+                  <a:lumMod val="75000"/>
+                </a:srgbClr>
+              </a:solidFill>
+              <a:effectLst/>
+              <a:uLnTx/>
+              <a:uFillTx/>
+              <a:latin typeface="Questrial" panose="02000000000000000000" pitchFamily="2" charset="0"/>
+              <a:ea typeface="+mn-ea"/>
+              <a:cs typeface="+mn-cs"/>
+            </a:endParaRPr>
+          </a:p>
+        </p:txBody>
+      </p:sp>
+      <p:sp>
+        <p:nvSpPr>
+          <p:cNvPr id="13" name="TextBox 12">
+            <a:extLst>
+              <a:ext uri="{FF2B5EF4-FFF2-40B4-BE49-F238E27FC236}">
+                <a16:creationId xmlns:a16="http://schemas.microsoft.com/office/drawing/2014/main" id="{9EDA8FBF-F9FE-4041-9CB0-1092C2F199D5}"/>
+              </a:ext>
+            </a:extLst>
+          </p:cNvPr>
+          <p:cNvSpPr txBox="1"/>
+          <p:nvPr/>
+        </p:nvSpPr>
+        <p:spPr>
+          <a:xfrm>
+            <a:off x="823598" y="3467454"/>
+            <a:ext cx="6440802" cy="400110"/>
+          </a:xfrm>
+          <a:prstGeom prst="rect">
+            <a:avLst/>
+          </a:prstGeom>
+          <a:noFill/>
+        </p:spPr>
+        <p:txBody>
+          <a:bodyPr wrap="square" rtlCol="0">
+            <a:spAutoFit/>
+          </a:bodyPr>
+          <a:lstStyle/>
+          <a:p>
+            <a:pPr marL="0" marR="0" lvl="0" indent="0" algn="l" defTabSz="457200" rtl="0" eaLnBrk="1" fontAlgn="auto" latinLnBrk="0" hangingPunct="1">
+              <a:lnSpc>
+                <a:spcPct val="100000"/>
+              </a:lnSpc>
+              <a:spcBef>
+                <a:spcPts val="0"/>
+              </a:spcBef>
+              <a:spcAft>
+                <a:spcPts val="0"/>
+              </a:spcAft>
+              <a:buClrTx/>
+              <a:buSzTx/>
+              <a:buFontTx/>
+              <a:buNone/>
+              <a:tabLst/>
+              <a:defRPr/>
+            </a:pPr>
+            <a:r>
+              <a:rPr kumimoji="0" lang="en-US" sz="2000" b="1" i="0" u="none" strike="noStrike" kern="1200" cap="none" spc="0" normalizeH="0" baseline="0" noProof="0" dirty="0">
+                <a:ln>
+                  <a:noFill/>
+                </a:ln>
+                <a:solidFill>
+                  <a:srgbClr val="16476F">
+                    <a:lumMod val="75000"/>
+                  </a:srgbClr>
+                </a:solidFill>
+                <a:effectLst/>
+                <a:uLnTx/>
+                <a:uFillTx/>
+                <a:latin typeface="Questrial" panose="02000000000000000000" pitchFamily="2" charset="0"/>
+                <a:ea typeface="+mn-ea"/>
+                <a:cs typeface="+mn-cs"/>
+              </a:rPr>
+              <a:t>Weighting by Completeness of Data (years)</a:t>
+            </a:r>
+          </a:p>
+        </p:txBody>
+      </p:sp>
+      <p:sp>
+        <p:nvSpPr>
+          <p:cNvPr id="14" name="TextBox 13">
+            <a:extLst>
+              <a:ext uri="{FF2B5EF4-FFF2-40B4-BE49-F238E27FC236}">
+                <a16:creationId xmlns:a16="http://schemas.microsoft.com/office/drawing/2014/main" id="{656EB245-FE34-4A97-9A5D-4DB09D35E754}"/>
+              </a:ext>
+            </a:extLst>
+          </p:cNvPr>
+          <p:cNvSpPr txBox="1"/>
+          <p:nvPr/>
+        </p:nvSpPr>
+        <p:spPr>
+          <a:xfrm>
+            <a:off x="823598" y="4601958"/>
+            <a:ext cx="6440802" cy="400110"/>
+          </a:xfrm>
+          <a:prstGeom prst="rect">
+            <a:avLst/>
+          </a:prstGeom>
+          <a:noFill/>
+        </p:spPr>
+        <p:txBody>
+          <a:bodyPr wrap="square" rtlCol="0">
+            <a:spAutoFit/>
+          </a:bodyPr>
+          <a:lstStyle/>
+          <a:p>
+            <a:pPr marL="0" marR="0" lvl="0" indent="0" algn="l" defTabSz="457200" rtl="0" eaLnBrk="1" fontAlgn="auto" latinLnBrk="0" hangingPunct="1">
+              <a:lnSpc>
+                <a:spcPct val="100000"/>
+              </a:lnSpc>
+              <a:spcBef>
+                <a:spcPts val="0"/>
+              </a:spcBef>
+              <a:spcAft>
+                <a:spcPts val="0"/>
+              </a:spcAft>
+              <a:buClrTx/>
+              <a:buSzTx/>
+              <a:buFontTx/>
+              <a:buNone/>
+              <a:tabLst/>
+              <a:defRPr/>
+            </a:pPr>
+            <a:r>
+              <a:rPr kumimoji="0" lang="en-US" sz="2000" b="1" i="0" u="none" strike="noStrike" kern="1200" cap="none" spc="0" normalizeH="0" baseline="0" noProof="0" dirty="0">
+                <a:ln>
+                  <a:noFill/>
+                </a:ln>
+                <a:solidFill>
+                  <a:srgbClr val="16476F">
+                    <a:lumMod val="75000"/>
+                  </a:srgbClr>
+                </a:solidFill>
+                <a:effectLst/>
+                <a:uLnTx/>
+                <a:uFillTx/>
+                <a:latin typeface="Questrial" panose="02000000000000000000" pitchFamily="2" charset="0"/>
+                <a:ea typeface="+mn-ea"/>
+                <a:cs typeface="+mn-cs"/>
+              </a:rPr>
+              <a:t>Weighting by Reliability of Data after Cleaning</a:t>
+            </a:r>
+          </a:p>
+        </p:txBody>
+      </p:sp>
+      <p:pic>
+        <p:nvPicPr>
+          <p:cNvPr id="11" name="Picture 10">
+            <a:extLst>
+              <a:ext uri="{FF2B5EF4-FFF2-40B4-BE49-F238E27FC236}">
+                <a16:creationId xmlns:a16="http://schemas.microsoft.com/office/drawing/2014/main" id="{F28F0055-7401-43EF-9F3D-6AB77C5F4B13}"/>
+              </a:ext>
+            </a:extLst>
+          </p:cNvPr>
+          <p:cNvPicPr>
+            <a:picLocks noChangeAspect="1"/>
+          </p:cNvPicPr>
+          <p:nvPr/>
+        </p:nvPicPr>
+        <p:blipFill rotWithShape="1">
+          <a:blip r:embed="rId5"/>
+          <a:srcRect l="6353" r="56968"/>
+          <a:stretch/>
+        </p:blipFill>
+        <p:spPr>
+          <a:xfrm>
+            <a:off x="8779334" y="2258004"/>
+            <a:ext cx="2961028" cy="1337073"/>
+          </a:xfrm>
+          <a:prstGeom prst="rect">
+            <a:avLst/>
+          </a:prstGeom>
+          <a:ln w="3175" cap="rnd">
+            <a:solidFill>
+              <a:schemeClr val="bg1"/>
+            </a:solidFill>
+          </a:ln>
+          <a:effectLst>
+            <a:outerShdw blurRad="76200" dist="95250" dir="10500000" sx="97000" sy="23000" kx="900000" algn="br" rotWithShape="0">
+              <a:srgbClr val="000000">
+                <a:alpha val="20000"/>
+              </a:srgbClr>
+            </a:outerShdw>
+          </a:effectLst>
+          <a:scene3d>
+            <a:camera prst="orthographicFront"/>
+            <a:lightRig rig="twoPt" dir="t">
+              <a:rot lat="0" lon="0" rev="7800000"/>
+            </a:lightRig>
+          </a:scene3d>
+          <a:sp3d contourW="6350">
+            <a:bevelT w="50800" h="16510"/>
+            <a:contourClr>
+              <a:srgbClr val="C0C0C0"/>
+            </a:contourClr>
+          </a:sp3d>
+        </p:spPr>
+      </p:pic>
+    </p:spTree>
+    <p:extLst>
+      <p:ext uri="{BB962C8B-B14F-4D97-AF65-F5344CB8AC3E}">
+        <p14:creationId xmlns:p14="http://schemas.microsoft.com/office/powerpoint/2010/main" val="2515085020"/>
+      </p:ext>
+    </p:extLst>
+  </p:cSld>
+  <p:clrMapOvr>
+    <a:masterClrMapping/>
+  </p:clrMapOvr>
+</p:sld>
+</file>
+
+<file path=ppt/slides/slide16.xml><?xml version="1.0" encoding="utf-8"?>
 <p:sld xmlns:a="http://schemas.openxmlformats.org/drawingml/2006/main" xmlns:r="http://schemas.openxmlformats.org/officeDocument/2006/relationships" xmlns:p="http://schemas.openxmlformats.org/presentationml/2006/main">
   <p:cSld>
     <p:spTree>
@@ -38264,7 +39606,7 @@
 </p:sld>
 </file>
 
-<file path=ppt/slides/slide15.xml><?xml version="1.0" encoding="utf-8"?>
+<file path=ppt/slides/slide17.xml><?xml version="1.0" encoding="utf-8"?>
 <p:sld xmlns:a="http://schemas.openxmlformats.org/drawingml/2006/main" xmlns:r="http://schemas.openxmlformats.org/officeDocument/2006/relationships" xmlns:p="http://schemas.openxmlformats.org/presentationml/2006/main">
   <p:cSld>
     <p:spTree>
@@ -38381,7 +39723,7 @@
 </p:sld>
 </file>
 
-<file path=ppt/slides/slide16.xml><?xml version="1.0" encoding="utf-8"?>
+<file path=ppt/slides/slide18.xml><?xml version="1.0" encoding="utf-8"?>
 <p:sld xmlns:a="http://schemas.openxmlformats.org/drawingml/2006/main" xmlns:r="http://schemas.openxmlformats.org/officeDocument/2006/relationships" xmlns:p="http://schemas.openxmlformats.org/presentationml/2006/main">
   <p:cSld>
     <p:spTree>
@@ -38673,7 +40015,7 @@
 </p:sld>
 </file>
 
-<file path=ppt/slides/slide17.xml><?xml version="1.0" encoding="utf-8"?>
+<file path=ppt/slides/slide19.xml><?xml version="1.0" encoding="utf-8"?>
 <p:sld xmlns:a="http://schemas.openxmlformats.org/drawingml/2006/main" xmlns:r="http://schemas.openxmlformats.org/officeDocument/2006/relationships" xmlns:p="http://schemas.openxmlformats.org/presentationml/2006/main">
   <p:cSld>
     <p:spTree>

</xml_diff>